<commit_message>
Added more links as references
</commit_message>
<xml_diff>
--- a/Week_3/Workout1.pptx
+++ b/Week_3/Workout1.pptx
@@ -1899,7 +1899,7 @@
           <a:graphicData uri="http://schemas.openxmlformats.org/presentationml/2006/ole">
             <mc:AlternateContent xmlns:mc="http://schemas.openxmlformats.org/markup-compatibility/2006">
               <mc:Choice xmlns:v="urn:schemas-microsoft-com:vml" Requires="v">
-                <p:oleObj spid="_x0000_s713746" name="Photo Editor Photo" r:id="rId3" imgW="9142857" imgH="743054" progId="">
+                <p:oleObj spid="_x0000_s713747" name="Photo Editor Photo" r:id="rId3" imgW="9142857" imgH="743054" progId="">
                   <p:embed/>
                 </p:oleObj>
               </mc:Choice>
@@ -3528,7 +3528,7 @@
           <a:graphicData uri="http://schemas.openxmlformats.org/presentationml/2006/ole">
             <mc:AlternateContent xmlns:mc="http://schemas.openxmlformats.org/markup-compatibility/2006">
               <mc:Choice xmlns:v="urn:schemas-microsoft-com:vml" Requires="v">
-                <p:oleObj spid="_x0000_s715794" name="Photo Editor Photo" r:id="rId3" imgW="9142857" imgH="743054" progId="">
+                <p:oleObj spid="_x0000_s715795" name="Photo Editor Photo" r:id="rId3" imgW="9142857" imgH="743054" progId="">
                   <p:embed/>
                 </p:oleObj>
               </mc:Choice>
@@ -8645,7 +8645,7 @@
           <a:graphicData uri="http://schemas.openxmlformats.org/presentationml/2006/ole">
             <mc:AlternateContent xmlns:mc="http://schemas.openxmlformats.org/markup-compatibility/2006">
               <mc:Choice xmlns:v="urn:schemas-microsoft-com:vml" Requires="v">
-                <p:oleObj spid="_x0000_s1042" name="Photo Editor Photo" r:id="rId17" imgW="9142857" imgH="743054" progId="">
+                <p:oleObj spid="_x0000_s1043" name="Photo Editor Photo" r:id="rId17" imgW="9142857" imgH="743054" progId="">
                   <p:embed/>
                 </p:oleObj>
               </mc:Choice>
@@ -13076,7 +13076,7 @@
           <a:graphicData uri="http://schemas.openxmlformats.org/presentationml/2006/ole">
             <mc:AlternateContent xmlns:mc="http://schemas.openxmlformats.org/markup-compatibility/2006">
               <mc:Choice xmlns:v="urn:schemas-microsoft-com:vml" Requires="v">
-                <p:oleObj spid="_x0000_s714834" name="Photo Editor Photo" r:id="rId4" imgW="1467055" imgH="390580" progId="">
+                <p:oleObj spid="_x0000_s714839" name="Photo Editor Photo" r:id="rId4" imgW="1467055" imgH="390580" progId="">
                   <p:embed/>
                 </p:oleObj>
               </mc:Choice>
@@ -13327,7 +13327,7 @@
           <a:graphicData uri="http://schemas.openxmlformats.org/presentationml/2006/ole">
             <mc:AlternateContent xmlns:mc="http://schemas.openxmlformats.org/markup-compatibility/2006">
               <mc:Choice xmlns:v="urn:schemas-microsoft-com:vml" Requires="v">
-                <p:oleObj spid="_x0000_s714835" name="Photo Editor Photo" r:id="rId6" imgW="9142857" imgH="3610479" progId="">
+                <p:oleObj spid="_x0000_s714840" name="Photo Editor Photo" r:id="rId6" imgW="9142857" imgH="3610479" progId="">
                   <p:embed/>
                 </p:oleObj>
               </mc:Choice>
@@ -13420,7 +13420,7 @@
           <a:graphicData uri="http://schemas.openxmlformats.org/presentationml/2006/ole">
             <mc:AlternateContent xmlns:mc="http://schemas.openxmlformats.org/markup-compatibility/2006">
               <mc:Choice xmlns:v="urn:schemas-microsoft-com:vml" Requires="v">
-                <p:oleObj spid="_x0000_s714836" name="Photo Editor Photo" r:id="rId8" imgW="1142857" imgH="914286" progId="">
+                <p:oleObj spid="_x0000_s714841" name="Photo Editor Photo" r:id="rId8" imgW="1142857" imgH="914286" progId="">
                   <p:embed/>
                 </p:oleObj>
               </mc:Choice>
@@ -13513,7 +13513,7 @@
           <a:graphicData uri="http://schemas.openxmlformats.org/presentationml/2006/ole">
             <mc:AlternateContent xmlns:mc="http://schemas.openxmlformats.org/markup-compatibility/2006">
               <mc:Choice xmlns:v="urn:schemas-microsoft-com:vml" Requires="v">
-                <p:oleObj spid="_x0000_s714837" name="Photo Editor Photo" r:id="rId10" imgW="1142857" imgH="914286" progId="">
+                <p:oleObj spid="_x0000_s714842" name="Photo Editor Photo" r:id="rId10" imgW="1142857" imgH="914286" progId="">
                   <p:embed/>
                 </p:oleObj>
               </mc:Choice>
@@ -13606,7 +13606,7 @@
           <a:graphicData uri="http://schemas.openxmlformats.org/presentationml/2006/ole">
             <mc:AlternateContent xmlns:mc="http://schemas.openxmlformats.org/markup-compatibility/2006">
               <mc:Choice xmlns:v="urn:schemas-microsoft-com:vml" Requires="v">
-                <p:oleObj spid="_x0000_s714838" name="Photo Editor Photo" r:id="rId12" imgW="1142857" imgH="914286" progId="">
+                <p:oleObj spid="_x0000_s714843" name="Photo Editor Photo" r:id="rId12" imgW="1142857" imgH="914286" progId="">
                   <p:embed/>
                 </p:oleObj>
               </mc:Choice>
@@ -14411,6 +14411,13 @@
   <p:clrMapOvr>
     <a:masterClrMapping/>
   </p:clrMapOvr>
+  <p:timing>
+    <p:tnLst>
+      <p:par>
+        <p:cTn id="1" dur="indefinite" restart="never" nodeType="tmRoot"/>
+      </p:par>
+    </p:tnLst>
+  </p:timing>
 </p:sld>
 </file>
 
@@ -14792,6 +14799,13 @@
   <p:clrMapOvr>
     <a:masterClrMapping/>
   </p:clrMapOvr>
+  <p:timing>
+    <p:tnLst>
+      <p:par>
+        <p:cTn id="1" dur="indefinite" restart="never" nodeType="tmRoot"/>
+      </p:par>
+    </p:tnLst>
+  </p:timing>
 </p:sld>
 </file>
 
@@ -14939,6 +14953,13 @@
   <p:clrMapOvr>
     <a:masterClrMapping/>
   </p:clrMapOvr>
+  <p:timing>
+    <p:tnLst>
+      <p:par>
+        <p:cTn id="1" dur="indefinite" restart="never" nodeType="tmRoot"/>
+      </p:par>
+    </p:tnLst>
+  </p:timing>
 </p:sld>
 </file>
 
@@ -15110,6 +15131,13 @@
   <p:clrMapOvr>
     <a:masterClrMapping/>
   </p:clrMapOvr>
+  <p:timing>
+    <p:tnLst>
+      <p:par>
+        <p:cTn id="1" dur="indefinite" restart="never" nodeType="tmRoot"/>
+      </p:par>
+    </p:tnLst>
+  </p:timing>
 </p:sld>
 </file>
 
@@ -15331,6 +15359,13 @@
   <p:clrMapOvr>
     <a:masterClrMapping/>
   </p:clrMapOvr>
+  <p:timing>
+    <p:tnLst>
+      <p:par>
+        <p:cTn id="1" dur="indefinite" restart="never" nodeType="tmRoot"/>
+      </p:par>
+    </p:tnLst>
+  </p:timing>
 </p:sld>
 </file>
 
@@ -15520,6 +15555,77 @@
               <a:buFont typeface="Arial" panose="020B0604020202020204" pitchFamily="34" charset="0"/>
               <a:buChar char="•"/>
             </a:pPr>
+            <a:r>
+              <a:rPr lang="en-US" sz="2000" u="sng" dirty="0">
+                <a:hlinkClick r:id="rId8"/>
+              </a:rPr>
+              <a:t>https://</a:t>
+            </a:r>
+            <a:r>
+              <a:rPr lang="en-US" sz="2000" u="sng" dirty="0" smtClean="0">
+                <a:hlinkClick r:id="rId8"/>
+              </a:rPr>
+              <a:t>github.com/damianfabian/react-course</a:t>
+            </a:r>
+            <a:r>
+              <a:rPr lang="en-US" sz="2000" u="sng" dirty="0" smtClean="0"/>
+              <a:t> </a:t>
+            </a:r>
+          </a:p>
+          <a:p>
+            <a:pPr>
+              <a:buFont typeface="Arial" panose="020B0604020202020204" pitchFamily="34" charset="0"/>
+              <a:buChar char="•"/>
+            </a:pPr>
+            <a:r>
+              <a:rPr lang="en-US" sz="2000" u="sng" dirty="0">
+                <a:hlinkClick r:id="rId9"/>
+              </a:rPr>
+              <a:t>https://</a:t>
+            </a:r>
+            <a:r>
+              <a:rPr lang="en-US" sz="2000" u="sng" dirty="0" smtClean="0">
+                <a:hlinkClick r:id="rId9"/>
+              </a:rPr>
+              <a:t>github.com/facebookincubator/create-react-app</a:t>
+            </a:r>
+            <a:endParaRPr lang="en-US" sz="2000" u="sng" dirty="0" smtClean="0"/>
+          </a:p>
+          <a:p>
+            <a:pPr>
+              <a:buFont typeface="Arial" panose="020B0604020202020204" pitchFamily="34" charset="0"/>
+              <a:buChar char="•"/>
+            </a:pPr>
+            <a:r>
+              <a:rPr lang="en-US" sz="2000" u="sng" dirty="0">
+                <a:hlinkClick r:id="rId10"/>
+              </a:rPr>
+              <a:t>https://</a:t>
+            </a:r>
+            <a:r>
+              <a:rPr lang="en-US" sz="2000" u="sng" dirty="0" smtClean="0">
+                <a:hlinkClick r:id="rId10"/>
+              </a:rPr>
+              <a:t>github.com/DimitriMikadze/express-react-redux-starter</a:t>
+            </a:r>
+            <a:endParaRPr lang="en-US" sz="2000" u="sng" dirty="0" smtClean="0"/>
+          </a:p>
+          <a:p>
+            <a:pPr>
+              <a:buFont typeface="Arial" panose="020B0604020202020204" pitchFamily="34" charset="0"/>
+              <a:buChar char="•"/>
+            </a:pPr>
+            <a:r>
+              <a:rPr lang="en-US" sz="2000" u="sng" dirty="0"/>
+              <a:t>https://github.com/mxstbr/react-boilerplate</a:t>
+            </a:r>
+            <a:endParaRPr lang="en-US" sz="2000" u="sng" dirty="0" smtClean="0"/>
+          </a:p>
+          <a:p>
+            <a:pPr>
+              <a:buFont typeface="Arial" panose="020B0604020202020204" pitchFamily="34" charset="0"/>
+              <a:buChar char="•"/>
+            </a:pPr>
             <a:endParaRPr lang="en-US" sz="2000" u="sng" dirty="0" smtClean="0"/>
           </a:p>
           <a:p>
@@ -15584,6 +15690,13 @@
   <p:clrMapOvr>
     <a:masterClrMapping/>
   </p:clrMapOvr>
+  <p:timing>
+    <p:tnLst>
+      <p:par>
+        <p:cTn id="1" dur="indefinite" restart="never" nodeType="tmRoot"/>
+      </p:par>
+    </p:tnLst>
+  </p:timing>
 </p:sld>
 </file>
 
@@ -15620,7 +15733,7 @@
           <a:graphicData uri="http://schemas.openxmlformats.org/presentationml/2006/ole">
             <mc:AlternateContent xmlns:mc="http://schemas.openxmlformats.org/markup-compatibility/2006">
               <mc:Choice xmlns:v="urn:schemas-microsoft-com:vml" Requires="v">
-                <p:oleObj spid="_x0000_s541783" r:id="rId4" imgW="9142857" imgH="3610479" progId="">
+                <p:oleObj spid="_x0000_s541788" r:id="rId4" imgW="9142857" imgH="3610479" progId="">
                   <p:embed/>
                 </p:oleObj>
               </mc:Choice>
@@ -15694,7 +15807,7 @@
           <a:graphicData uri="http://schemas.openxmlformats.org/presentationml/2006/ole">
             <mc:AlternateContent xmlns:mc="http://schemas.openxmlformats.org/markup-compatibility/2006">
               <mc:Choice xmlns:v="urn:schemas-microsoft-com:vml" Requires="v">
-                <p:oleObj spid="_x0000_s541784" r:id="rId6" imgW="1467055" imgH="390580" progId="">
+                <p:oleObj spid="_x0000_s541789" r:id="rId6" imgW="1467055" imgH="390580" progId="">
                   <p:embed/>
                 </p:oleObj>
               </mc:Choice>
@@ -15970,7 +16083,7 @@
           <a:graphicData uri="http://schemas.openxmlformats.org/presentationml/2006/ole">
             <mc:AlternateContent xmlns:mc="http://schemas.openxmlformats.org/markup-compatibility/2006">
               <mc:Choice xmlns:v="urn:schemas-microsoft-com:vml" Requires="v">
-                <p:oleObj spid="_x0000_s541785" r:id="rId8" imgW="866896" imgH="704948" progId="">
+                <p:oleObj spid="_x0000_s541790" r:id="rId8" imgW="866896" imgH="704948" progId="">
                   <p:embed/>
                 </p:oleObj>
               </mc:Choice>
@@ -16044,7 +16157,7 @@
           <a:graphicData uri="http://schemas.openxmlformats.org/presentationml/2006/ole">
             <mc:AlternateContent xmlns:mc="http://schemas.openxmlformats.org/markup-compatibility/2006">
               <mc:Choice xmlns:v="urn:schemas-microsoft-com:vml" Requires="v">
-                <p:oleObj spid="_x0000_s541786" r:id="rId10" imgW="866896" imgH="704948" progId="">
+                <p:oleObj spid="_x0000_s541791" r:id="rId10" imgW="866896" imgH="704948" progId="">
                   <p:embed/>
                 </p:oleObj>
               </mc:Choice>
@@ -16118,7 +16231,7 @@
           <a:graphicData uri="http://schemas.openxmlformats.org/presentationml/2006/ole">
             <mc:AlternateContent xmlns:mc="http://schemas.openxmlformats.org/markup-compatibility/2006">
               <mc:Choice xmlns:v="urn:schemas-microsoft-com:vml" Requires="v">
-                <p:oleObj spid="_x0000_s541787" r:id="rId12" imgW="866896" imgH="704948" progId="">
+                <p:oleObj spid="_x0000_s541792" r:id="rId12" imgW="866896" imgH="704948" progId="">
                   <p:embed/>
                 </p:oleObj>
               </mc:Choice>

</xml_diff>